<commit_message>
updated version of powerpoint and document of the analysis
</commit_message>
<xml_diff>
--- a/Project1_EquipoF_Covid.pptx
+++ b/Project1_EquipoF_Covid.pptx
@@ -213,7 +213,7 @@
           <a:p>
             <a:fld id="{18570CD1-C891-3F40-B60B-8B9248A0CCC5}" type="datetimeFigureOut">
               <a:rPr lang="es-MX" smtClean="0"/>
-              <a:t>15/05/2020</a:t>
+              <a:t>16/05/2020</a:t>
             </a:fld>
             <a:endParaRPr lang="es-MX"/>
           </a:p>
@@ -1648,7 +1648,7 @@
           <a:graphicData uri="http://schemas.openxmlformats.org/presentationml/2006/ole">
             <mc:AlternateContent xmlns:mc="http://schemas.openxmlformats.org/markup-compatibility/2006">
               <mc:Choice xmlns:v="urn:schemas-microsoft-com:vml" Requires="v">
-                <p:oleObj spid="_x0000_s1033" name="Diapositiva de think-cell" r:id="rId7" imgW="425" imgH="424" progId="TCLayout.ActiveDocument.1">
+                <p:oleObj spid="_x0000_s1034" name="Diapositiva de think-cell" r:id="rId7" imgW="425" imgH="424" progId="TCLayout.ActiveDocument.1">
                   <p:embed/>
                 </p:oleObj>
               </mc:Choice>
@@ -2722,7 +2722,6 @@
               <a:rPr lang="en-US" sz="1000" dirty="0"/>
               <a:t>8</a:t>
             </a:r>
-            <a:endParaRPr lang="en-US" sz="1000" dirty="0"/>
           </a:p>
         </p:txBody>
       </p:sp>
@@ -2781,7 +2780,7 @@
           <a:graphicData uri="http://schemas.openxmlformats.org/presentationml/2006/ole">
             <mc:AlternateContent xmlns:mc="http://schemas.openxmlformats.org/markup-compatibility/2006">
               <mc:Choice xmlns:v="urn:schemas-microsoft-com:vml" Requires="v">
-                <p:oleObj spid="_x0000_s2064" name="Diapositiva de think-cell" r:id="rId6" imgW="425" imgH="424" progId="TCLayout.ActiveDocument.1">
+                <p:oleObj spid="_x0000_s2065" name="Diapositiva de think-cell" r:id="rId6" imgW="425" imgH="424" progId="TCLayout.ActiveDocument.1">
                   <p:embed/>
                 </p:oleObj>
               </mc:Choice>
@@ -3258,7 +3257,7 @@
           <a:graphicData uri="http://schemas.openxmlformats.org/presentationml/2006/ole">
             <mc:AlternateContent xmlns:mc="http://schemas.openxmlformats.org/markup-compatibility/2006">
               <mc:Choice xmlns:v="urn:schemas-microsoft-com:vml" Requires="v">
-                <p:oleObj spid="_x0000_s3086" name="Diapositiva de think-cell" r:id="rId6" imgW="425" imgH="424" progId="TCLayout.ActiveDocument.1">
+                <p:oleObj spid="_x0000_s3087" name="Diapositiva de think-cell" r:id="rId6" imgW="425" imgH="424" progId="TCLayout.ActiveDocument.1">
                   <p:embed/>
                 </p:oleObj>
               </mc:Choice>
@@ -3403,11 +3402,7 @@
             </a:r>
             <a:r>
               <a:rPr lang="en-US" dirty="0" smtClean="0"/>
-              <a:t>translates into </a:t>
-            </a:r>
-            <a:r>
-              <a:rPr lang="en-US" dirty="0" smtClean="0"/>
-              <a:t>hospital </a:t>
+              <a:t>translates into hospital </a:t>
             </a:r>
             <a:r>
               <a:rPr lang="en-US" dirty="0"/>
@@ -3534,7 +3529,7 @@
           <a:graphicData uri="http://schemas.openxmlformats.org/presentationml/2006/ole">
             <mc:AlternateContent xmlns:mc="http://schemas.openxmlformats.org/markup-compatibility/2006">
               <mc:Choice xmlns:v="urn:schemas-microsoft-com:vml" Requires="v">
-                <p:oleObj spid="_x0000_s6155" name="Diapositiva de think-cell" r:id="rId5" imgW="425" imgH="424" progId="TCLayout.ActiveDocument.1">
+                <p:oleObj spid="_x0000_s6156" name="Diapositiva de think-cell" r:id="rId5" imgW="425" imgH="424" progId="TCLayout.ActiveDocument.1">
                   <p:embed/>
                 </p:oleObj>
               </mc:Choice>
@@ -3910,15 +3905,7 @@
             </a:r>
             <a:r>
               <a:rPr lang="en-US" sz="2000" dirty="0" smtClean="0"/>
-              <a:t>to a) </a:t>
-            </a:r>
-            <a:r>
-              <a:rPr lang="en-US" sz="2000" dirty="0" smtClean="0"/>
-              <a:t>scarce </a:t>
-            </a:r>
-            <a:r>
-              <a:rPr lang="en-US" sz="2000" dirty="0" smtClean="0"/>
-              <a:t>information or b) lack </a:t>
+              <a:t>to a) scarce information or b) lack </a:t>
             </a:r>
             <a:r>
               <a:rPr lang="en-US" sz="2000" dirty="0"/>
@@ -4218,11 +4205,23 @@
             </a:r>
             <a:r>
               <a:rPr lang="en-US" sz="2400" dirty="0"/>
-              <a:t>people worldwide now claiming over </a:t>
+              <a:t>people worldwide now claiming </a:t>
+            </a:r>
+            <a:r>
+              <a:rPr lang="en-US" sz="2400"/>
+              <a:t>over </a:t>
+            </a:r>
+            <a:r>
+              <a:rPr lang="en-US" sz="2400" smtClean="0"/>
+              <a:t>300</a:t>
+            </a:r>
+            <a:r>
+              <a:rPr lang="en-US" sz="2400" smtClean="0"/>
+              <a:t> </a:t>
             </a:r>
             <a:r>
               <a:rPr lang="en-US" sz="2400" dirty="0" smtClean="0"/>
-              <a:t>250 K lives.</a:t>
+              <a:t>K lives.</a:t>
             </a:r>
             <a:endParaRPr lang="en-US" sz="2400" dirty="0"/>
           </a:p>
@@ -4233,11 +4232,7 @@
             </a:r>
             <a:r>
               <a:rPr lang="en-US" sz="2400" dirty="0" smtClean="0"/>
-              <a:t>regions more affected than others? Should lowe</a:t>
-            </a:r>
-            <a:r>
-              <a:rPr lang="en-US" sz="2400" dirty="0" smtClean="0"/>
-              <a:t>r income countries be more exposed to COVID-19 cases and deaths?</a:t>
+              <a:t>regions more affected than others? Should lower income countries be more exposed to COVID-19 cases and deaths?</a:t>
             </a:r>
             <a:endParaRPr lang="en-US" sz="2400" dirty="0"/>
           </a:p>
@@ -4900,7 +4895,7 @@
           <a:graphicData uri="http://schemas.openxmlformats.org/presentationml/2006/ole">
             <mc:AlternateContent xmlns:mc="http://schemas.openxmlformats.org/markup-compatibility/2006">
               <mc:Choice xmlns:v="urn:schemas-microsoft-com:vml" Requires="v">
-                <p:oleObj spid="_x0000_s4106" name="Diapositiva de think-cell" r:id="rId5" imgW="425" imgH="424" progId="TCLayout.ActiveDocument.1">
+                <p:oleObj spid="_x0000_s4107" name="Diapositiva de think-cell" r:id="rId5" imgW="425" imgH="424" progId="TCLayout.ActiveDocument.1">
                   <p:embed/>
                 </p:oleObj>
               </mc:Choice>
@@ -5175,7 +5170,7 @@
           <a:graphicData uri="http://schemas.openxmlformats.org/presentationml/2006/ole">
             <mc:AlternateContent xmlns:mc="http://schemas.openxmlformats.org/markup-compatibility/2006">
               <mc:Choice xmlns:v="urn:schemas-microsoft-com:vml" Requires="v">
-                <p:oleObj spid="_x0000_s5130" name="Diapositiva de think-cell" r:id="rId5" imgW="425" imgH="424" progId="TCLayout.ActiveDocument.1">
+                <p:oleObj spid="_x0000_s5131" name="Diapositiva de think-cell" r:id="rId5" imgW="425" imgH="424" progId="TCLayout.ActiveDocument.1">
                   <p:embed/>
                 </p:oleObj>
               </mc:Choice>
@@ -5868,7 +5863,6 @@
               <a:rPr lang="en-US" sz="1000" dirty="0"/>
               <a:t>6</a:t>
             </a:r>
-            <a:endParaRPr lang="en-US" sz="1000" dirty="0"/>
           </a:p>
         </p:txBody>
       </p:sp>
@@ -5934,7 +5928,7 @@
           <a:graphicData uri="http://schemas.openxmlformats.org/presentationml/2006/ole">
             <mc:AlternateContent xmlns:mc="http://schemas.openxmlformats.org/markup-compatibility/2006">
               <mc:Choice xmlns:v="urn:schemas-microsoft-com:vml" Requires="v">
-                <p:oleObj spid="_x0000_s7171" name="Diapositiva de think-cell" r:id="rId6" imgW="425" imgH="424" progId="TCLayout.ActiveDocument.1">
+                <p:oleObj spid="_x0000_s7172" name="Diapositiva de think-cell" r:id="rId6" imgW="425" imgH="424" progId="TCLayout.ActiveDocument.1">
                   <p:embed/>
                 </p:oleObj>
               </mc:Choice>
@@ -6576,7 +6570,6 @@
               <a:rPr lang="en-US" sz="1000" dirty="0"/>
               <a:t>7</a:t>
             </a:r>
-            <a:endParaRPr lang="en-US" sz="1000" dirty="0"/>
           </a:p>
         </p:txBody>
       </p:sp>

</xml_diff>